<commit_message>
Correção do PITCH versão final - ajuste do LOGO
</commit_message>
<xml_diff>
--- a/PastaDocumentos/PITCH.pptx
+++ b/PastaDocumentos/PITCH.pptx
@@ -3380,16 +3380,16 @@
               <a:rPr lang="pt-BR"/>
               <a:t>PITCH</a:t>
             </a:r>
-            <a:endParaRPr lang="en-US"/>
-          </a:p>
-        </p:txBody>
-      </p:sp>
-      <p:sp>
-        <p:nvSpPr>
-          <p:cNvPr id="4" name="Oval 3">
-            <a:extLst>
-              <a:ext uri="{FF2B5EF4-FFF2-40B4-BE49-F238E27FC236}">
-                <a16:creationId xmlns:a16="http://schemas.microsoft.com/office/drawing/2014/main" id="{870095C3-AB26-4CE8-9A64-B75E44B1E1D7}"/>
+            <a:endParaRPr lang="en-US" dirty="0"/>
+          </a:p>
+        </p:txBody>
+      </p:sp>
+      <p:sp>
+        <p:nvSpPr>
+          <p:cNvPr id="4" name="Rectangle 3">
+            <a:extLst>
+              <a:ext uri="{FF2B5EF4-FFF2-40B4-BE49-F238E27FC236}">
+                <a16:creationId xmlns:a16="http://schemas.microsoft.com/office/drawing/2014/main" id="{88474CC9-B910-41CE-8217-C8208EFFC6D7}"/>
               </a:ext>
             </a:extLst>
           </p:cNvPr>
@@ -3398,10 +3398,10 @@
         </p:nvSpPr>
         <p:spPr>
           <a:xfrm>
-            <a:off x="8906933" y="4222044"/>
-            <a:ext cx="1761067" cy="1655762"/>
+            <a:off x="1196622" y="4380089"/>
+            <a:ext cx="2517422" cy="1524000"/>
           </a:xfrm>
-          <a:prstGeom prst="ellipse">
+          <a:prstGeom prst="rect">
             <a:avLst/>
           </a:prstGeom>
         </p:spPr>
@@ -3427,10 +3427,9 @@
           <a:p>
             <a:pPr algn="ctr"/>
             <a:r>
-              <a:rPr lang="pt-BR"/>
+              <a:rPr lang="pt-BR" dirty="0"/>
               <a:t>LOGO DO PROJETO</a:t>
             </a:r>
-            <a:endParaRPr lang="en-US"/>
           </a:p>
         </p:txBody>
       </p:sp>

</xml_diff>